<commit_message>
[docs] edit se-jun Introduce
S04P31A201-2
</commit_message>
<xml_diff>
--- a/docs/Introduce/SDS_자기소개_강세준.pptx
+++ b/docs/Introduce/SDS_자기소개_강세준.pptx
@@ -9,7 +9,7 @@
   </p:notesMasterIdLst>
   <p:sldIdLst>
     <p:sldId id="269" r:id="rId2"/>
-    <p:sldId id="268" r:id="rId3"/>
+    <p:sldId id="271" r:id="rId3"/>
     <p:sldId id="270" r:id="rId4"/>
   </p:sldIdLst>
   <p:sldSz cx="12192000" cy="6858000"/>
@@ -1159,7 +1159,7 @@
     </p:spTree>
     <p:extLst>
       <p:ext uri="{BB962C8B-B14F-4D97-AF65-F5344CB8AC3E}">
-        <p14:creationId xmlns:p14="http://schemas.microsoft.com/office/powerpoint/2010/main" val="2254182253"/>
+        <p14:creationId xmlns:p14="http://schemas.microsoft.com/office/powerpoint/2010/main" val="1002122779"/>
       </p:ext>
     </p:extLst>
   </p:cSld>
@@ -5244,11 +5244,7 @@
           <a:p>
             <a:r>
               <a:rPr lang="ko-KR" altLang="en-US" dirty="0" smtClean="0"/>
-              <a:t>취업 뒤의 </a:t>
-            </a:r>
-            <a:r>
-              <a:rPr lang="ko-KR" altLang="en-US" dirty="0" smtClean="0"/>
-              <a:t>현업에서 개발을 할 때</a:t>
+              <a:t>취업 뒤의 현업에서 개발을 할 때</a:t>
             </a:r>
             <a:r>
               <a:rPr lang="en-US" altLang="ko-KR" dirty="0" smtClean="0"/>
@@ -5267,12 +5263,12 @@
               <a:t>그래서 미리 경험 할 수 있다면 </a:t>
             </a:r>
             <a:r>
-              <a:rPr lang="ko-KR" altLang="en-US" dirty="0" err="1" smtClean="0"/>
-              <a:t>좋을것이라고</a:t>
-            </a:r>
-            <a:r>
               <a:rPr lang="ko-KR" altLang="en-US" dirty="0" smtClean="0"/>
-              <a:t> 생각을 했고 어떤 식으로 테스트 자동화 및 관리</a:t>
+              <a:t>좋을 것이라고 </a:t>
+            </a:r>
+            <a:r>
+              <a:rPr lang="ko-KR" altLang="en-US" dirty="0" smtClean="0"/>
+              <a:t>생각을 했고 어떤 식으로 테스트 자동화 및 관리</a:t>
             </a:r>
             <a:r>
               <a:rPr lang="en-US" altLang="ko-KR" dirty="0" smtClean="0"/>
@@ -5483,13 +5479,13 @@
       </p:sp>
       <p:sp>
         <p:nvSpPr>
-          <p:cNvPr id="21" name="모서리가 둥근 직사각형 20"/>
+          <p:cNvPr id="40" name="모서리가 둥근 직사각형 39"/>
           <p:cNvSpPr/>
           <p:nvPr/>
         </p:nvSpPr>
         <p:spPr>
           <a:xfrm>
-            <a:off x="1021359" y="2524781"/>
+            <a:off x="1021360" y="4478985"/>
             <a:ext cx="1884219" cy="429491"/>
           </a:xfrm>
           <a:prstGeom prst="roundRect">
@@ -5525,7 +5521,7 @@
             <a:pPr algn="ctr"/>
             <a:r>
               <a:rPr lang="ko-KR" altLang="en-US" sz="1600" b="1" dirty="0" smtClean="0"/>
-              <a:t>기술 스택</a:t>
+              <a:t>기대 효과</a:t>
             </a:r>
             <a:endParaRPr lang="ko-KR" altLang="en-US" sz="1600" b="1" dirty="0"/>
           </a:p>
@@ -5533,13 +5529,169 @@
       </p:sp>
       <p:sp>
         <p:nvSpPr>
-          <p:cNvPr id="40" name="모서리가 둥근 직사각형 39"/>
+          <p:cNvPr id="5" name="TextBox 4"/>
+          <p:cNvSpPr txBox="1"/>
+          <p:nvPr/>
+        </p:nvSpPr>
+        <p:spPr>
+          <a:xfrm>
+            <a:off x="3083660" y="1934726"/>
+            <a:ext cx="7018701" cy="369332"/>
+          </a:xfrm>
+          <a:prstGeom prst="rect">
+            <a:avLst/>
+          </a:prstGeom>
+          <a:noFill/>
+        </p:spPr>
+        <p:txBody>
+          <a:bodyPr wrap="square" rtlCol="0">
+            <a:spAutoFit/>
+          </a:bodyPr>
+          <a:lstStyle/>
+          <a:p>
+            <a:r>
+              <a:rPr lang="ko-KR" altLang="en-US" dirty="0" smtClean="0"/>
+              <a:t>전자책</a:t>
+            </a:r>
+            <a:r>
+              <a:rPr lang="en-US" altLang="ko-KR" dirty="0" smtClean="0"/>
+              <a:t>(</a:t>
+            </a:r>
+            <a:r>
+              <a:rPr lang="en-US" altLang="ko-KR" dirty="0" err="1" smtClean="0"/>
+              <a:t>ePUB</a:t>
+            </a:r>
+            <a:r>
+              <a:rPr lang="en-US" altLang="ko-KR" dirty="0" smtClean="0"/>
+              <a:t>) </a:t>
+            </a:r>
+            <a:r>
+              <a:rPr lang="ko-KR" altLang="en-US" dirty="0" smtClean="0"/>
+              <a:t>편집기 프로그램</a:t>
+            </a:r>
+            <a:r>
+              <a:rPr lang="en-US" altLang="ko-KR" dirty="0" smtClean="0"/>
+              <a:t>(</a:t>
+            </a:r>
+            <a:r>
+              <a:rPr lang="en-US" altLang="ko-KR" dirty="0" err="1" smtClean="0"/>
+              <a:t>Dabook</a:t>
+            </a:r>
+            <a:r>
+              <a:rPr lang="en-US" altLang="ko-KR" dirty="0" smtClean="0"/>
+              <a:t>) : </a:t>
+            </a:r>
+            <a:r>
+              <a:rPr lang="ko-KR" altLang="en-US" dirty="0" smtClean="0"/>
+              <a:t>공통 프로젝트 반 </a:t>
+            </a:r>
+            <a:r>
+              <a:rPr lang="en-US" altLang="ko-KR" dirty="0" smtClean="0"/>
+              <a:t>2</a:t>
+            </a:r>
+            <a:r>
+              <a:rPr lang="ko-KR" altLang="en-US" dirty="0" smtClean="0"/>
+              <a:t>등</a:t>
+            </a:r>
+            <a:endParaRPr lang="ko-KR" altLang="en-US" dirty="0"/>
+          </a:p>
+        </p:txBody>
+      </p:sp>
+      <p:sp>
+        <p:nvSpPr>
+          <p:cNvPr id="6" name="직사각형 5"/>
           <p:cNvSpPr/>
           <p:nvPr/>
         </p:nvSpPr>
         <p:spPr>
           <a:xfrm>
-            <a:off x="1021360" y="4171255"/>
+            <a:off x="3005864" y="4478985"/>
+            <a:ext cx="8608773" cy="1200329"/>
+          </a:xfrm>
+          <a:prstGeom prst="rect">
+            <a:avLst/>
+          </a:prstGeom>
+        </p:spPr>
+        <p:txBody>
+          <a:bodyPr wrap="square">
+            <a:spAutoFit/>
+          </a:bodyPr>
+          <a:lstStyle/>
+          <a:p>
+            <a:pPr marL="285750" indent="-285750">
+              <a:buFontTx/>
+              <a:buChar char="-"/>
+            </a:pPr>
+            <a:r>
+              <a:rPr lang="ko-KR" altLang="en-US" dirty="0" smtClean="0"/>
+              <a:t>1</a:t>
+            </a:r>
+            <a:r>
+              <a:rPr lang="ko-KR" altLang="en-US" dirty="0"/>
+              <a:t>인 출판 접근성 확대 : 사용자에게 친숙한 </a:t>
+            </a:r>
+            <a:r>
+              <a:rPr lang="ko-KR" altLang="en-US" dirty="0" err="1"/>
+              <a:t>GUI를</a:t>
+            </a:r>
+            <a:r>
+              <a:rPr lang="ko-KR" altLang="en-US" dirty="0"/>
+              <a:t> 통해 전자책을 쉽게 출판할 수 있도록 합니다. </a:t>
+            </a:r>
+            <a:endParaRPr lang="en-US" altLang="ko-KR" dirty="0" smtClean="0"/>
+          </a:p>
+          <a:p>
+            <a:pPr marL="285750" indent="-285750">
+              <a:buFontTx/>
+              <a:buChar char="-"/>
+            </a:pPr>
+            <a:r>
+              <a:rPr lang="ko-KR" altLang="en-US" dirty="0" smtClean="0"/>
+              <a:t>외부 </a:t>
+            </a:r>
+            <a:r>
+              <a:rPr lang="ko-KR" altLang="en-US" dirty="0"/>
+              <a:t>플랫폼으로의 확장성 : </a:t>
+            </a:r>
+            <a:r>
+              <a:rPr lang="ko-KR" altLang="en-US" dirty="0" err="1"/>
+              <a:t>ePUB</a:t>
+            </a:r>
+            <a:r>
+              <a:rPr lang="ko-KR" altLang="en-US" dirty="0"/>
+              <a:t> 규격에 따라 제작되었기 때문에, </a:t>
+            </a:r>
+            <a:endParaRPr lang="en-US" altLang="ko-KR" dirty="0" smtClean="0"/>
+          </a:p>
+          <a:p>
+            <a:r>
+              <a:rPr lang="en-US" altLang="ko-KR" dirty="0"/>
+              <a:t> </a:t>
+            </a:r>
+            <a:r>
+              <a:rPr lang="en-US" altLang="ko-KR" dirty="0" smtClean="0"/>
+              <a:t>  </a:t>
+            </a:r>
+            <a:r>
+              <a:rPr lang="ko-KR" altLang="en-US" dirty="0" smtClean="0"/>
+              <a:t>생성한 </a:t>
+            </a:r>
+            <a:r>
+              <a:rPr lang="ko-KR" altLang="en-US" dirty="0"/>
+              <a:t>전자책을 태블릿, 타 전자책 플랫폼에서 볼 수 있습니다.</a:t>
+            </a:r>
+          </a:p>
+        </p:txBody>
+      </p:sp>
+      <p:sp>
+        <p:nvSpPr>
+          <p:cNvPr id="12" name="모서리가 둥근 직사각형 11"/>
+          <p:cNvSpPr/>
+          <p:nvPr/>
+        </p:nvSpPr>
+        <p:spPr>
+          <a:xfrm>
+            <a:off x="1021360" y="3036616"/>
             <a:ext cx="1884219" cy="429491"/>
           </a:xfrm>
           <a:prstGeom prst="roundRect">
@@ -5575,236 +5727,6 @@
             <a:pPr algn="ctr"/>
             <a:r>
               <a:rPr lang="ko-KR" altLang="en-US" sz="1600" b="1" dirty="0" smtClean="0"/>
-              <a:t>기대 효과</a:t>
-            </a:r>
-            <a:endParaRPr lang="ko-KR" altLang="en-US" sz="1600" b="1" dirty="0"/>
-          </a:p>
-        </p:txBody>
-      </p:sp>
-      <p:sp>
-        <p:nvSpPr>
-          <p:cNvPr id="5" name="TextBox 4"/>
-          <p:cNvSpPr txBox="1"/>
-          <p:nvPr/>
-        </p:nvSpPr>
-        <p:spPr>
-          <a:xfrm>
-            <a:off x="3083660" y="1934726"/>
-            <a:ext cx="7018701" cy="369332"/>
-          </a:xfrm>
-          <a:prstGeom prst="rect">
-            <a:avLst/>
-          </a:prstGeom>
-          <a:noFill/>
-        </p:spPr>
-        <p:txBody>
-          <a:bodyPr wrap="square" rtlCol="0">
-            <a:spAutoFit/>
-          </a:bodyPr>
-          <a:lstStyle/>
-          <a:p>
-            <a:r>
-              <a:rPr lang="ko-KR" altLang="en-US" dirty="0" smtClean="0"/>
-              <a:t>전자책</a:t>
-            </a:r>
-            <a:r>
-              <a:rPr lang="en-US" altLang="ko-KR" dirty="0" smtClean="0"/>
-              <a:t>(</a:t>
-            </a:r>
-            <a:r>
-              <a:rPr lang="en-US" altLang="ko-KR" dirty="0" err="1" smtClean="0"/>
-              <a:t>ePUB</a:t>
-            </a:r>
-            <a:r>
-              <a:rPr lang="en-US" altLang="ko-KR" dirty="0" smtClean="0"/>
-              <a:t>) </a:t>
-            </a:r>
-            <a:r>
-              <a:rPr lang="ko-KR" altLang="en-US" dirty="0" smtClean="0"/>
-              <a:t>편집기 프로그램</a:t>
-            </a:r>
-            <a:r>
-              <a:rPr lang="en-US" altLang="ko-KR" dirty="0" smtClean="0"/>
-              <a:t>(</a:t>
-            </a:r>
-            <a:r>
-              <a:rPr lang="en-US" altLang="ko-KR" dirty="0" err="1" smtClean="0"/>
-              <a:t>Dabook</a:t>
-            </a:r>
-            <a:r>
-              <a:rPr lang="en-US" altLang="ko-KR" dirty="0" smtClean="0"/>
-              <a:t>) : </a:t>
-            </a:r>
-            <a:r>
-              <a:rPr lang="ko-KR" altLang="en-US" dirty="0" smtClean="0"/>
-              <a:t>공통 프로젝트 반 </a:t>
-            </a:r>
-            <a:r>
-              <a:rPr lang="en-US" altLang="ko-KR" dirty="0" smtClean="0"/>
-              <a:t>2</a:t>
-            </a:r>
-            <a:r>
-              <a:rPr lang="ko-KR" altLang="en-US" dirty="0" smtClean="0"/>
-              <a:t>등</a:t>
-            </a:r>
-            <a:endParaRPr lang="ko-KR" altLang="en-US" dirty="0"/>
-          </a:p>
-        </p:txBody>
-      </p:sp>
-      <p:sp>
-        <p:nvSpPr>
-          <p:cNvPr id="6" name="직사각형 5"/>
-          <p:cNvSpPr/>
-          <p:nvPr/>
-        </p:nvSpPr>
-        <p:spPr>
-          <a:xfrm>
-            <a:off x="3005864" y="4171255"/>
-            <a:ext cx="8608773" cy="1200329"/>
-          </a:xfrm>
-          <a:prstGeom prst="rect">
-            <a:avLst/>
-          </a:prstGeom>
-        </p:spPr>
-        <p:txBody>
-          <a:bodyPr wrap="square">
-            <a:spAutoFit/>
-          </a:bodyPr>
-          <a:lstStyle/>
-          <a:p>
-            <a:pPr marL="285750" indent="-285750">
-              <a:buFontTx/>
-              <a:buChar char="-"/>
-            </a:pPr>
-            <a:r>
-              <a:rPr lang="ko-KR" altLang="en-US" dirty="0" smtClean="0"/>
-              <a:t>1</a:t>
-            </a:r>
-            <a:r>
-              <a:rPr lang="ko-KR" altLang="en-US" dirty="0"/>
-              <a:t>인 출판 접근성 확대 : 사용자에게 친숙한 </a:t>
-            </a:r>
-            <a:r>
-              <a:rPr lang="ko-KR" altLang="en-US" dirty="0" err="1"/>
-              <a:t>GUI를</a:t>
-            </a:r>
-            <a:r>
-              <a:rPr lang="ko-KR" altLang="en-US" dirty="0"/>
-              <a:t> 통해 전자책을 쉽게 출판할 수 있도록 합니다. </a:t>
-            </a:r>
-            <a:endParaRPr lang="en-US" altLang="ko-KR" dirty="0" smtClean="0"/>
-          </a:p>
-          <a:p>
-            <a:pPr marL="285750" indent="-285750">
-              <a:buFontTx/>
-              <a:buChar char="-"/>
-            </a:pPr>
-            <a:r>
-              <a:rPr lang="ko-KR" altLang="en-US" dirty="0" smtClean="0"/>
-              <a:t>외부 </a:t>
-            </a:r>
-            <a:r>
-              <a:rPr lang="ko-KR" altLang="en-US" dirty="0"/>
-              <a:t>플랫폼으로의 확장성 : </a:t>
-            </a:r>
-            <a:r>
-              <a:rPr lang="ko-KR" altLang="en-US" dirty="0" err="1"/>
-              <a:t>ePUB</a:t>
-            </a:r>
-            <a:r>
-              <a:rPr lang="ko-KR" altLang="en-US" dirty="0"/>
-              <a:t> 규격에 따라 제작되었기 때문에, </a:t>
-            </a:r>
-            <a:endParaRPr lang="en-US" altLang="ko-KR" dirty="0" smtClean="0"/>
-          </a:p>
-          <a:p>
-            <a:r>
-              <a:rPr lang="en-US" altLang="ko-KR" dirty="0"/>
-              <a:t> </a:t>
-            </a:r>
-            <a:r>
-              <a:rPr lang="en-US" altLang="ko-KR" dirty="0" smtClean="0"/>
-              <a:t>  </a:t>
-            </a:r>
-            <a:r>
-              <a:rPr lang="ko-KR" altLang="en-US" dirty="0" smtClean="0"/>
-              <a:t>생성한 </a:t>
-            </a:r>
-            <a:r>
-              <a:rPr lang="ko-KR" altLang="en-US" dirty="0"/>
-              <a:t>전자책을 태블릿, 타 전자책 플랫폼에서 볼 수 있습니다.</a:t>
-            </a:r>
-          </a:p>
-        </p:txBody>
-      </p:sp>
-      <p:pic>
-        <p:nvPicPr>
-          <p:cNvPr id="9" name="그림 8"/>
-          <p:cNvPicPr>
-            <a:picLocks noChangeAspect="1"/>
-          </p:cNvPicPr>
-          <p:nvPr/>
-        </p:nvPicPr>
-        <p:blipFill>
-          <a:blip r:embed="rId3"/>
-          <a:stretch>
-            <a:fillRect/>
-          </a:stretch>
-        </p:blipFill>
-        <p:spPr>
-          <a:xfrm>
-            <a:off x="3083660" y="2468731"/>
-            <a:ext cx="2517808" cy="1531813"/>
-          </a:xfrm>
-          <a:prstGeom prst="rect">
-            <a:avLst/>
-          </a:prstGeom>
-        </p:spPr>
-      </p:pic>
-      <p:sp>
-        <p:nvSpPr>
-          <p:cNvPr id="12" name="모서리가 둥근 직사각형 11"/>
-          <p:cNvSpPr/>
-          <p:nvPr/>
-        </p:nvSpPr>
-        <p:spPr>
-          <a:xfrm>
-            <a:off x="1021359" y="5710754"/>
-            <a:ext cx="1884219" cy="429491"/>
-          </a:xfrm>
-          <a:prstGeom prst="roundRect">
-            <a:avLst/>
-          </a:prstGeom>
-          <a:solidFill>
-            <a:srgbClr val="00B050"/>
-          </a:solidFill>
-          <a:ln>
-            <a:noFill/>
-          </a:ln>
-        </p:spPr>
-        <p:style>
-          <a:lnRef idx="2">
-            <a:schemeClr val="accent1">
-              <a:shade val="50000"/>
-            </a:schemeClr>
-          </a:lnRef>
-          <a:fillRef idx="1">
-            <a:schemeClr val="accent1"/>
-          </a:fillRef>
-          <a:effectRef idx="0">
-            <a:schemeClr val="accent1"/>
-          </a:effectRef>
-          <a:fontRef idx="minor">
-            <a:schemeClr val="lt1"/>
-          </a:fontRef>
-        </p:style>
-        <p:txBody>
-          <a:bodyPr rtlCol="0" anchor="ctr"/>
-          <a:lstStyle/>
-          <a:p>
-            <a:pPr algn="ctr"/>
-            <a:r>
-              <a:rPr lang="ko-KR" altLang="en-US" sz="1600" b="1" dirty="0" smtClean="0"/>
               <a:t>역할</a:t>
             </a:r>
             <a:endParaRPr lang="ko-KR" altLang="en-US" sz="1600" b="1" dirty="0"/>
@@ -5819,7 +5741,7 @@
         </p:nvSpPr>
         <p:spPr>
           <a:xfrm>
-            <a:off x="3083660" y="5712089"/>
+            <a:off x="3083661" y="3037951"/>
             <a:ext cx="6471045" cy="369332"/>
           </a:xfrm>
           <a:prstGeom prst="rect">
@@ -5834,12 +5756,16 @@
           <a:lstStyle/>
           <a:p>
             <a:r>
+              <a:rPr lang="en-US" altLang="ko-KR" dirty="0" smtClean="0"/>
+              <a:t>Spring </a:t>
+            </a:r>
+            <a:r>
               <a:rPr lang="ko-KR" altLang="en-US" dirty="0" smtClean="0"/>
-              <a:t>웹 서버 </a:t>
+              <a:t>웹 </a:t>
             </a:r>
             <a:r>
               <a:rPr lang="ko-KR" altLang="en-US" dirty="0" smtClean="0"/>
-              <a:t>구축</a:t>
+              <a:t>서버 구축</a:t>
             </a:r>
             <a:r>
               <a:rPr lang="en-US" altLang="ko-KR" dirty="0" smtClean="0"/>
@@ -5865,30 +5791,6 @@
           </a:p>
         </p:txBody>
       </p:sp>
-      <p:pic>
-        <p:nvPicPr>
-          <p:cNvPr id="8" name="그림 7"/>
-          <p:cNvPicPr>
-            <a:picLocks noChangeAspect="1"/>
-          </p:cNvPicPr>
-          <p:nvPr/>
-        </p:nvPicPr>
-        <p:blipFill>
-          <a:blip r:embed="rId4"/>
-          <a:stretch>
-            <a:fillRect/>
-          </a:stretch>
-        </p:blipFill>
-        <p:spPr>
-          <a:xfrm>
-            <a:off x="6163520" y="2468731"/>
-            <a:ext cx="2655164" cy="1654855"/>
-          </a:xfrm>
-          <a:prstGeom prst="rect">
-            <a:avLst/>
-          </a:prstGeom>
-        </p:spPr>
-      </p:pic>
       <p:sp>
         <p:nvSpPr>
           <p:cNvPr id="11" name="직사각형 10"/>
@@ -5920,7 +5822,7 @@
     </p:spTree>
     <p:extLst>
       <p:ext uri="{BB962C8B-B14F-4D97-AF65-F5344CB8AC3E}">
-        <p14:creationId xmlns:p14="http://schemas.microsoft.com/office/powerpoint/2010/main" val="3614181248"/>
+        <p14:creationId xmlns:p14="http://schemas.microsoft.com/office/powerpoint/2010/main" val="4026693426"/>
       </p:ext>
     </p:extLst>
   </p:cSld>
@@ -5996,13 +5898,203 @@
       </p:sp>
       <p:sp>
         <p:nvSpPr>
-          <p:cNvPr id="2" name="모서리가 둥근 직사각형 1"/>
+          <p:cNvPr id="4" name="TextBox 3"/>
+          <p:cNvSpPr txBox="1"/>
+          <p:nvPr/>
+        </p:nvSpPr>
+        <p:spPr>
+          <a:xfrm>
+            <a:off x="3057041" y="1866098"/>
+            <a:ext cx="5997844" cy="369332"/>
+          </a:xfrm>
+          <a:prstGeom prst="rect">
+            <a:avLst/>
+          </a:prstGeom>
+          <a:noFill/>
+        </p:spPr>
+        <p:txBody>
+          <a:bodyPr wrap="square" rtlCol="0">
+            <a:spAutoFit/>
+          </a:bodyPr>
+          <a:lstStyle/>
+          <a:p>
+            <a:r>
+              <a:rPr lang="ko-KR" altLang="en-US" dirty="0" smtClean="0"/>
+              <a:t>안전하게 만날 수 있는 약속 장소 추천 서비스</a:t>
+            </a:r>
+            <a:r>
+              <a:rPr lang="en-US" altLang="ko-KR" dirty="0" smtClean="0"/>
+              <a:t>(CO-MEET)</a:t>
+            </a:r>
+            <a:endParaRPr lang="ko-KR" altLang="en-US" dirty="0"/>
+          </a:p>
+        </p:txBody>
+      </p:sp>
+      <p:sp>
+        <p:nvSpPr>
+          <p:cNvPr id="15" name="TextBox 14"/>
+          <p:cNvSpPr txBox="1"/>
+          <p:nvPr/>
+        </p:nvSpPr>
+        <p:spPr>
+          <a:xfrm>
+            <a:off x="3057040" y="3036616"/>
+            <a:ext cx="9134959" cy="830997"/>
+          </a:xfrm>
+          <a:prstGeom prst="rect">
+            <a:avLst/>
+          </a:prstGeom>
+          <a:noFill/>
+        </p:spPr>
+        <p:txBody>
+          <a:bodyPr wrap="square" rtlCol="0">
+            <a:spAutoFit/>
+          </a:bodyPr>
+          <a:lstStyle/>
+          <a:p>
+            <a:r>
+              <a:rPr lang="en-US" altLang="ko-KR" sz="1600" dirty="0" smtClean="0"/>
+              <a:t>Django – Swagger </a:t>
+            </a:r>
+            <a:r>
+              <a:rPr lang="ko-KR" altLang="en-US" sz="1600" dirty="0" smtClean="0"/>
+              <a:t>연동</a:t>
+            </a:r>
+            <a:r>
+              <a:rPr lang="en-US" altLang="ko-KR" sz="1600" dirty="0" smtClean="0"/>
+              <a:t>, </a:t>
+            </a:r>
+            <a:r>
+              <a:rPr lang="ko-KR" altLang="en-US" sz="1600" dirty="0" smtClean="0"/>
+              <a:t>회원 </a:t>
+            </a:r>
+            <a:r>
+              <a:rPr lang="en-US" altLang="ko-KR" sz="1600" dirty="0" smtClean="0"/>
+              <a:t>CRUD</a:t>
+            </a:r>
+            <a:r>
+              <a:rPr lang="ko-KR" altLang="en-US" sz="1600" dirty="0" smtClean="0"/>
+              <a:t> 구현</a:t>
+            </a:r>
+            <a:r>
+              <a:rPr lang="en-US" altLang="ko-KR" sz="1600" dirty="0" smtClean="0"/>
+              <a:t>, MongoDB </a:t>
+            </a:r>
+            <a:r>
+              <a:rPr lang="ko-KR" altLang="en-US" sz="1600" dirty="0" smtClean="0"/>
+              <a:t>연동</a:t>
+            </a:r>
+            <a:r>
+              <a:rPr lang="en-US" altLang="ko-KR" sz="1600" dirty="0" smtClean="0"/>
+              <a:t>, </a:t>
+            </a:r>
+            <a:endParaRPr lang="en-US" altLang="ko-KR" sz="1600" dirty="0" smtClean="0"/>
+          </a:p>
+          <a:p>
+            <a:endParaRPr lang="en-US" altLang="ko-KR" sz="1600" dirty="0"/>
+          </a:p>
+          <a:p>
+            <a:r>
+              <a:rPr lang="ko-KR" altLang="en-US" sz="1600" dirty="0" smtClean="0"/>
+              <a:t>데이터 </a:t>
+            </a:r>
+            <a:r>
+              <a:rPr lang="ko-KR" altLang="en-US" sz="1600" dirty="0" smtClean="0"/>
+              <a:t>분석 알고리즘 구현</a:t>
+            </a:r>
+            <a:endParaRPr lang="ko-KR" altLang="en-US" sz="1600" dirty="0"/>
+          </a:p>
+        </p:txBody>
+      </p:sp>
+      <p:sp>
+        <p:nvSpPr>
+          <p:cNvPr id="6" name="TextBox 5"/>
+          <p:cNvSpPr txBox="1"/>
+          <p:nvPr/>
+        </p:nvSpPr>
+        <p:spPr>
+          <a:xfrm>
+            <a:off x="3057040" y="4477589"/>
+            <a:ext cx="6865749" cy="861774"/>
+          </a:xfrm>
+          <a:prstGeom prst="rect">
+            <a:avLst/>
+          </a:prstGeom>
+          <a:noFill/>
+        </p:spPr>
+        <p:txBody>
+          <a:bodyPr wrap="square" rtlCol="0">
+            <a:spAutoFit/>
+          </a:bodyPr>
+          <a:lstStyle/>
+          <a:p>
+            <a:pPr marL="285750" indent="-285750">
+              <a:buFontTx/>
+              <a:buChar char="-"/>
+            </a:pPr>
+            <a:r>
+              <a:rPr lang="en-US" altLang="ko-KR" sz="1600" dirty="0" smtClean="0"/>
+              <a:t>3GB</a:t>
+            </a:r>
+            <a:r>
+              <a:rPr lang="ko-KR" altLang="en-US" sz="1600" dirty="0" smtClean="0"/>
+              <a:t>가 넘는 대량의 데이터를 활용 및 분석 해볼 수 있었던 경험</a:t>
+            </a:r>
+            <a:endParaRPr lang="en-US" altLang="ko-KR" sz="1600" dirty="0" smtClean="0"/>
+          </a:p>
+          <a:p>
+            <a:pPr marL="285750" indent="-285750">
+              <a:buFontTx/>
+              <a:buChar char="-"/>
+            </a:pPr>
+            <a:r>
+              <a:rPr lang="en-US" altLang="ko-KR" sz="1600" dirty="0" err="1" smtClean="0"/>
+              <a:t>Redis</a:t>
+            </a:r>
+            <a:r>
+              <a:rPr lang="en-US" altLang="ko-KR" sz="1600" dirty="0" smtClean="0"/>
+              <a:t> </a:t>
+            </a:r>
+            <a:r>
+              <a:rPr lang="ko-KR" altLang="en-US" sz="1600" dirty="0" smtClean="0"/>
+              <a:t>캐시 서버에 </a:t>
+            </a:r>
+            <a:r>
+              <a:rPr lang="en-US" altLang="ko-KR" sz="1600" dirty="0" smtClean="0"/>
+              <a:t>JWT </a:t>
+            </a:r>
+            <a:r>
+              <a:rPr lang="ko-KR" altLang="en-US" sz="1600" dirty="0" smtClean="0"/>
+              <a:t>토큰 저장</a:t>
+            </a:r>
+            <a:endParaRPr lang="en-US" altLang="ko-KR" sz="1600" dirty="0"/>
+          </a:p>
+          <a:p>
+            <a:pPr marL="285750" indent="-285750">
+              <a:buFontTx/>
+              <a:buChar char="-"/>
+            </a:pPr>
+            <a:r>
+              <a:rPr lang="en-US" altLang="ko-KR" sz="1600" dirty="0" smtClean="0"/>
+              <a:t>Django </a:t>
+            </a:r>
+            <a:r>
+              <a:rPr lang="ko-KR" altLang="en-US" sz="1600" dirty="0" smtClean="0"/>
+              <a:t>프레임워크를 새로 경험</a:t>
+            </a:r>
+            <a:endParaRPr lang="en-US" altLang="ko-KR" sz="1600" dirty="0" smtClean="0"/>
+          </a:p>
+        </p:txBody>
+      </p:sp>
+      <p:sp>
+        <p:nvSpPr>
+          <p:cNvPr id="17" name="모서리가 둥근 직사각형 16"/>
           <p:cNvSpPr/>
           <p:nvPr/>
         </p:nvSpPr>
         <p:spPr>
           <a:xfrm>
-            <a:off x="1021358" y="1836019"/>
+            <a:off x="1021360" y="1904647"/>
             <a:ext cx="1884219" cy="429491"/>
           </a:xfrm>
           <a:prstGeom prst="roundRect">
@@ -6046,47 +6138,13 @@
       </p:sp>
       <p:sp>
         <p:nvSpPr>
-          <p:cNvPr id="4" name="TextBox 3"/>
-          <p:cNvSpPr txBox="1"/>
+          <p:cNvPr id="18" name="모서리가 둥근 직사각형 17"/>
+          <p:cNvSpPr/>
           <p:nvPr/>
         </p:nvSpPr>
         <p:spPr>
           <a:xfrm>
-            <a:off x="3057041" y="1866098"/>
-            <a:ext cx="5997844" cy="369332"/>
-          </a:xfrm>
-          <a:prstGeom prst="rect">
-            <a:avLst/>
-          </a:prstGeom>
-          <a:noFill/>
-        </p:spPr>
-        <p:txBody>
-          <a:bodyPr wrap="square" rtlCol="0">
-            <a:spAutoFit/>
-          </a:bodyPr>
-          <a:lstStyle/>
-          <a:p>
-            <a:r>
-              <a:rPr lang="ko-KR" altLang="en-US" dirty="0" smtClean="0"/>
-              <a:t>안전하게 만날 수 있는 약속 장소 추천 서비스</a:t>
-            </a:r>
-            <a:r>
-              <a:rPr lang="en-US" altLang="ko-KR" dirty="0" smtClean="0"/>
-              <a:t>(CO-MEET)</a:t>
-            </a:r>
-            <a:endParaRPr lang="ko-KR" altLang="en-US" dirty="0"/>
-          </a:p>
-        </p:txBody>
-      </p:sp>
-      <p:sp>
-        <p:nvSpPr>
-          <p:cNvPr id="10" name="모서리가 둥근 직사각형 9"/>
-          <p:cNvSpPr/>
-          <p:nvPr/>
-        </p:nvSpPr>
-        <p:spPr>
-          <a:xfrm>
-            <a:off x="1021359" y="2524781"/>
+            <a:off x="1021360" y="4478985"/>
             <a:ext cx="1884219" cy="429491"/>
           </a:xfrm>
           <a:prstGeom prst="roundRect">
@@ -6122,7 +6180,7 @@
             <a:pPr algn="ctr"/>
             <a:r>
               <a:rPr lang="ko-KR" altLang="en-US" sz="1600" b="1" dirty="0" smtClean="0"/>
-              <a:t>기술 스택</a:t>
+              <a:t>기대 효과</a:t>
             </a:r>
             <a:endParaRPr lang="ko-KR" altLang="en-US" sz="1600" b="1" dirty="0"/>
           </a:p>
@@ -6130,13 +6188,13 @@
       </p:sp>
       <p:sp>
         <p:nvSpPr>
-          <p:cNvPr id="11" name="모서리가 둥근 직사각형 10"/>
+          <p:cNvPr id="19" name="모서리가 둥근 직사각형 18"/>
           <p:cNvSpPr/>
           <p:nvPr/>
         </p:nvSpPr>
         <p:spPr>
           <a:xfrm>
-            <a:off x="1052357" y="4592501"/>
+            <a:off x="1021360" y="3036616"/>
             <a:ext cx="1884219" cy="429491"/>
           </a:xfrm>
           <a:prstGeom prst="roundRect">
@@ -6175,283 +6233,6 @@
               <a:t>역할</a:t>
             </a:r>
             <a:endParaRPr lang="ko-KR" altLang="en-US" sz="1600" b="1" dirty="0"/>
-          </a:p>
-        </p:txBody>
-      </p:sp>
-      <p:sp>
-        <p:nvSpPr>
-          <p:cNvPr id="12" name="모서리가 둥근 직사각형 11"/>
-          <p:cNvSpPr/>
-          <p:nvPr/>
-        </p:nvSpPr>
-        <p:spPr>
-          <a:xfrm>
-            <a:off x="1052357" y="5210933"/>
-            <a:ext cx="1884219" cy="429491"/>
-          </a:xfrm>
-          <a:prstGeom prst="roundRect">
-            <a:avLst/>
-          </a:prstGeom>
-          <a:solidFill>
-            <a:srgbClr val="00B050"/>
-          </a:solidFill>
-          <a:ln>
-            <a:noFill/>
-          </a:ln>
-        </p:spPr>
-        <p:style>
-          <a:lnRef idx="2">
-            <a:schemeClr val="accent1">
-              <a:shade val="50000"/>
-            </a:schemeClr>
-          </a:lnRef>
-          <a:fillRef idx="1">
-            <a:schemeClr val="accent1"/>
-          </a:fillRef>
-          <a:effectRef idx="0">
-            <a:schemeClr val="accent1"/>
-          </a:effectRef>
-          <a:fontRef idx="minor">
-            <a:schemeClr val="lt1"/>
-          </a:fontRef>
-        </p:style>
-        <p:txBody>
-          <a:bodyPr rtlCol="0" anchor="ctr"/>
-          <a:lstStyle/>
-          <a:p>
-            <a:pPr algn="ctr"/>
-            <a:r>
-              <a:rPr lang="ko-KR" altLang="en-US" sz="1600" b="1" dirty="0" smtClean="0"/>
-              <a:t>성과</a:t>
-            </a:r>
-            <a:endParaRPr lang="ko-KR" altLang="en-US" sz="1600" b="1" dirty="0"/>
-          </a:p>
-        </p:txBody>
-      </p:sp>
-      <p:pic>
-        <p:nvPicPr>
-          <p:cNvPr id="1026" name="Picture 2" descr="https://cdn.discordapp.com/attachments/821553873743249428/829659864418091048/unknown.png"/>
-          <p:cNvPicPr>
-            <a:picLocks noChangeAspect="1" noChangeArrowheads="1"/>
-          </p:cNvPicPr>
-          <p:nvPr/>
-        </p:nvPicPr>
-        <p:blipFill>
-          <a:blip r:embed="rId3" cstate="print">
-            <a:extLst>
-              <a:ext uri="{28A0092B-C50C-407E-A947-70E740481C1C}">
-                <a14:useLocalDpi xmlns:a14="http://schemas.microsoft.com/office/drawing/2010/main" val="0"/>
-              </a:ext>
-            </a:extLst>
-          </a:blip>
-          <a:srcRect/>
-          <a:stretch>
-            <a:fillRect/>
-          </a:stretch>
-        </p:blipFill>
-        <p:spPr bwMode="auto">
-          <a:xfrm>
-            <a:off x="3057041" y="2431791"/>
-            <a:ext cx="3354489" cy="1691801"/>
-          </a:xfrm>
-          <a:prstGeom prst="rect">
-            <a:avLst/>
-          </a:prstGeom>
-          <a:noFill/>
-          <a:extLst>
-            <a:ext uri="{909E8E84-426E-40DD-AFC4-6F175D3DCCD1}">
-              <a14:hiddenFill xmlns:a14="http://schemas.microsoft.com/office/drawing/2010/main">
-                <a:solidFill>
-                  <a:srgbClr val="FFFFFF"/>
-                </a:solidFill>
-              </a14:hiddenFill>
-            </a:ext>
-          </a:extLst>
-        </p:spPr>
-      </p:pic>
-      <p:pic>
-        <p:nvPicPr>
-          <p:cNvPr id="5" name="그림 4"/>
-          <p:cNvPicPr>
-            <a:picLocks noChangeAspect="1"/>
-          </p:cNvPicPr>
-          <p:nvPr/>
-        </p:nvPicPr>
-        <p:blipFill>
-          <a:blip r:embed="rId4"/>
-          <a:stretch>
-            <a:fillRect/>
-          </a:stretch>
-        </p:blipFill>
-        <p:spPr>
-          <a:xfrm>
-            <a:off x="6947043" y="2431791"/>
-            <a:ext cx="3463049" cy="1626912"/>
-          </a:xfrm>
-          <a:prstGeom prst="rect">
-            <a:avLst/>
-          </a:prstGeom>
-        </p:spPr>
-      </p:pic>
-      <p:sp>
-        <p:nvSpPr>
-          <p:cNvPr id="15" name="TextBox 14"/>
-          <p:cNvSpPr txBox="1"/>
-          <p:nvPr/>
-        </p:nvSpPr>
-        <p:spPr>
-          <a:xfrm>
-            <a:off x="3057040" y="4622580"/>
-            <a:ext cx="9134959" cy="338554"/>
-          </a:xfrm>
-          <a:prstGeom prst="rect">
-            <a:avLst/>
-          </a:prstGeom>
-          <a:noFill/>
-        </p:spPr>
-        <p:txBody>
-          <a:bodyPr wrap="square" rtlCol="0">
-            <a:spAutoFit/>
-          </a:bodyPr>
-          <a:lstStyle/>
-          <a:p>
-            <a:r>
-              <a:rPr lang="en-US" altLang="ko-KR" sz="1600" dirty="0" smtClean="0"/>
-              <a:t>Django </a:t>
-            </a:r>
-            <a:r>
-              <a:rPr lang="en-US" altLang="ko-KR" sz="1600" dirty="0" smtClean="0"/>
-              <a:t>– Swagger </a:t>
-            </a:r>
-            <a:r>
-              <a:rPr lang="ko-KR" altLang="en-US" sz="1600" dirty="0" smtClean="0"/>
-              <a:t>연동</a:t>
-            </a:r>
-            <a:r>
-              <a:rPr lang="en-US" altLang="ko-KR" sz="1600" dirty="0" smtClean="0"/>
-              <a:t>, </a:t>
-            </a:r>
-            <a:r>
-              <a:rPr lang="ko-KR" altLang="en-US" sz="1600" dirty="0" smtClean="0"/>
-              <a:t>회원 </a:t>
-            </a:r>
-            <a:r>
-              <a:rPr lang="en-US" altLang="ko-KR" sz="1600" dirty="0" smtClean="0"/>
-              <a:t>CRUD</a:t>
-            </a:r>
-            <a:r>
-              <a:rPr lang="ko-KR" altLang="en-US" sz="1600" dirty="0" smtClean="0"/>
-              <a:t> </a:t>
-            </a:r>
-            <a:r>
-              <a:rPr lang="ko-KR" altLang="en-US" sz="1600" dirty="0" smtClean="0"/>
-              <a:t>구현</a:t>
-            </a:r>
-            <a:r>
-              <a:rPr lang="en-US" altLang="ko-KR" sz="1600" dirty="0" smtClean="0"/>
-              <a:t>, MongoDB </a:t>
-            </a:r>
-            <a:r>
-              <a:rPr lang="ko-KR" altLang="en-US" sz="1600" dirty="0" smtClean="0"/>
-              <a:t>연동</a:t>
-            </a:r>
-            <a:r>
-              <a:rPr lang="en-US" altLang="ko-KR" sz="1600" dirty="0" smtClean="0"/>
-              <a:t>, </a:t>
-            </a:r>
-            <a:r>
-              <a:rPr lang="ko-KR" altLang="en-US" sz="1600" dirty="0" smtClean="0"/>
-              <a:t>데이터 분석 알고리즘 구현</a:t>
-            </a:r>
-            <a:endParaRPr lang="ko-KR" altLang="en-US" sz="1600" dirty="0"/>
-          </a:p>
-        </p:txBody>
-      </p:sp>
-      <p:sp>
-        <p:nvSpPr>
-          <p:cNvPr id="6" name="TextBox 5"/>
-          <p:cNvSpPr txBox="1"/>
-          <p:nvPr/>
-        </p:nvSpPr>
-        <p:spPr>
-          <a:xfrm>
-            <a:off x="3057040" y="5210933"/>
-            <a:ext cx="6865749" cy="861774"/>
-          </a:xfrm>
-          <a:prstGeom prst="rect">
-            <a:avLst/>
-          </a:prstGeom>
-          <a:noFill/>
-        </p:spPr>
-        <p:txBody>
-          <a:bodyPr wrap="square" rtlCol="0">
-            <a:spAutoFit/>
-          </a:bodyPr>
-          <a:lstStyle/>
-          <a:p>
-            <a:pPr marL="285750" indent="-285750">
-              <a:buFontTx/>
-              <a:buChar char="-"/>
-            </a:pPr>
-            <a:r>
-              <a:rPr lang="en-US" altLang="ko-KR" sz="1600" dirty="0" smtClean="0"/>
-              <a:t>3GB</a:t>
-            </a:r>
-            <a:r>
-              <a:rPr lang="ko-KR" altLang="en-US" sz="1600" dirty="0" smtClean="0"/>
-              <a:t>가 넘는 대량의 데이터를 </a:t>
-            </a:r>
-            <a:r>
-              <a:rPr lang="ko-KR" altLang="en-US" sz="1600" dirty="0" smtClean="0"/>
-              <a:t>활용 및 분석 해볼 </a:t>
-            </a:r>
-            <a:r>
-              <a:rPr lang="ko-KR" altLang="en-US" sz="1600" dirty="0" smtClean="0"/>
-              <a:t>수 있었던 경험</a:t>
-            </a:r>
-            <a:endParaRPr lang="en-US" altLang="ko-KR" sz="1600" dirty="0" smtClean="0"/>
-          </a:p>
-          <a:p>
-            <a:pPr marL="285750" indent="-285750">
-              <a:buFontTx/>
-              <a:buChar char="-"/>
-            </a:pPr>
-            <a:r>
-              <a:rPr lang="en-US" altLang="ko-KR" sz="1600" dirty="0" err="1" smtClean="0"/>
-              <a:t>Redis</a:t>
-            </a:r>
-            <a:r>
-              <a:rPr lang="en-US" altLang="ko-KR" sz="1600" dirty="0" smtClean="0"/>
-              <a:t> </a:t>
-            </a:r>
-            <a:r>
-              <a:rPr lang="ko-KR" altLang="en-US" sz="1600" dirty="0" smtClean="0"/>
-              <a:t>캐시 서버에 </a:t>
-            </a:r>
-            <a:r>
-              <a:rPr lang="en-US" altLang="ko-KR" sz="1600" dirty="0" smtClean="0"/>
-              <a:t>JWT </a:t>
-            </a:r>
-            <a:r>
-              <a:rPr lang="ko-KR" altLang="en-US" sz="1600" dirty="0" smtClean="0"/>
-              <a:t>토큰 저장</a:t>
-            </a:r>
-            <a:endParaRPr lang="en-US" altLang="ko-KR" sz="1600" dirty="0"/>
-          </a:p>
-          <a:p>
-            <a:pPr marL="285750" indent="-285750">
-              <a:buFontTx/>
-              <a:buChar char="-"/>
-            </a:pPr>
-            <a:r>
-              <a:rPr lang="en-US" altLang="ko-KR" sz="1600" dirty="0" smtClean="0"/>
-              <a:t>Django </a:t>
-            </a:r>
-            <a:r>
-              <a:rPr lang="ko-KR" altLang="en-US" sz="1600" dirty="0" smtClean="0"/>
-              <a:t>프레임워크를 새로 경험</a:t>
-            </a:r>
-            <a:endParaRPr lang="en-US" altLang="ko-KR" sz="1600" dirty="0" smtClean="0"/>
           </a:p>
         </p:txBody>
       </p:sp>

</xml_diff>